<commit_message>
presentation: update design with expanded gbe
</commit_message>
<xml_diff>
--- a/bms-poster-presentations/presentations/bms-application-design.pptx
+++ b/bms-poster-presentations/presentations/bms-application-design.pptx
@@ -5,25 +5,28 @@
     <p:sldMasterId id="2147483648" r:id="rId1"/>
   </p:sldMasterIdLst>
   <p:notesMasterIdLst>
-    <p:notesMasterId r:id="rId15"/>
+    <p:notesMasterId r:id="rId18"/>
   </p:notesMasterIdLst>
   <p:handoutMasterIdLst>
-    <p:handoutMasterId r:id="rId16"/>
+    <p:handoutMasterId r:id="rId19"/>
   </p:handoutMasterIdLst>
   <p:sldIdLst>
     <p:sldId id="256" r:id="rId2"/>
     <p:sldId id="260" r:id="rId3"/>
     <p:sldId id="269" r:id="rId4"/>
-    <p:sldId id="263" r:id="rId5"/>
-    <p:sldId id="262" r:id="rId6"/>
-    <p:sldId id="271" r:id="rId7"/>
-    <p:sldId id="270" r:id="rId8"/>
-    <p:sldId id="273" r:id="rId9"/>
-    <p:sldId id="268" r:id="rId10"/>
-    <p:sldId id="264" r:id="rId11"/>
-    <p:sldId id="272" r:id="rId12"/>
-    <p:sldId id="266" r:id="rId13"/>
-    <p:sldId id="265" r:id="rId14"/>
+    <p:sldId id="275" r:id="rId5"/>
+    <p:sldId id="263" r:id="rId6"/>
+    <p:sldId id="262" r:id="rId7"/>
+    <p:sldId id="271" r:id="rId8"/>
+    <p:sldId id="270" r:id="rId9"/>
+    <p:sldId id="274" r:id="rId10"/>
+    <p:sldId id="273" r:id="rId11"/>
+    <p:sldId id="276" r:id="rId12"/>
+    <p:sldId id="268" r:id="rId13"/>
+    <p:sldId id="264" r:id="rId14"/>
+    <p:sldId id="272" r:id="rId15"/>
+    <p:sldId id="266" r:id="rId16"/>
+    <p:sldId id="265" r:id="rId17"/>
   </p:sldIdLst>
   <p:sldSz cx="9144000" cy="6858000" type="screen4x3"/>
   <p:notesSz cx="6858000" cy="9144000"/>
@@ -207,7 +210,7 @@
           <a:p>
             <a:fld id="{72DEC1AA-C750-A84D-81DA-1A499B26F9CE}" type="datetimeFigureOut">
               <a:rPr lang="en-US" smtClean="0"/>
-              <a:t>10/30/15</a:t>
+              <a:t>11/8/15</a:t>
             </a:fld>
             <a:endParaRPr lang="en-US"/>
           </a:p>
@@ -373,7 +376,7 @@
           <a:p>
             <a:fld id="{1DBDE364-0F34-2842-82C5-F59C1E7267F9}" type="datetimeFigureOut">
               <a:rPr lang="en-US" smtClean="0"/>
-              <a:t>10/30/15</a:t>
+              <a:t>11/8/15</a:t>
             </a:fld>
             <a:endParaRPr lang="en-US"/>
           </a:p>
@@ -642,6 +645,104 @@
 </p:notesMaster>
 </file>
 
+<file path=ppt/notesSlides/notesSlide1.xml><?xml version="1.0" encoding="utf-8"?>
+<p:notes xmlns:a="http://schemas.openxmlformats.org/drawingml/2006/main" xmlns:r="http://schemas.openxmlformats.org/officeDocument/2006/relationships" xmlns:p="http://schemas.openxmlformats.org/presentationml/2006/main">
+  <p:cSld>
+    <p:spTree>
+      <p:nvGrpSpPr>
+        <p:cNvPr id="1" name=""/>
+        <p:cNvGrpSpPr/>
+        <p:nvPr/>
+      </p:nvGrpSpPr>
+      <p:grpSpPr>
+        <a:xfrm>
+          <a:off x="0" y="0"/>
+          <a:ext cx="0" cy="0"/>
+          <a:chOff x="0" y="0"/>
+          <a:chExt cx="0" cy="0"/>
+        </a:xfrm>
+      </p:grpSpPr>
+      <p:sp>
+        <p:nvSpPr>
+          <p:cNvPr id="2" name="Slide Image Placeholder 1"/>
+          <p:cNvSpPr>
+            <a:spLocks noGrp="1" noRot="1" noChangeAspect="1"/>
+          </p:cNvSpPr>
+          <p:nvPr>
+            <p:ph type="sldImg"/>
+          </p:nvPr>
+        </p:nvSpPr>
+        <p:spPr/>
+      </p:sp>
+      <p:sp>
+        <p:nvSpPr>
+          <p:cNvPr id="3" name="Notes Placeholder 2"/>
+          <p:cNvSpPr>
+            <a:spLocks noGrp="1"/>
+          </p:cNvSpPr>
+          <p:nvPr>
+            <p:ph type="body" idx="1"/>
+          </p:nvPr>
+        </p:nvSpPr>
+        <p:spPr/>
+        <p:txBody>
+          <a:bodyPr/>
+          <a:lstStyle/>
+          <a:p>
+            <a:r>
+              <a:rPr lang="en-US" baseline="0" dirty="0" smtClean="0"/>
+              <a:t>Does this violate</a:t>
+            </a:r>
+            <a:r>
+              <a:rPr lang="en-US" baseline="0" dirty="0" smtClean="0"/>
+              <a:t> ”longest shared prefix” method for finding primary group names? (Slide 11, group-encryption-v0.4)</a:t>
+            </a:r>
+          </a:p>
+          <a:p>
+            <a:r>
+              <a:rPr lang="en-US" baseline="0" dirty="0" smtClean="0"/>
+              <a:t>And expand E-Key / D-Key generation and distribution by group manager</a:t>
+            </a:r>
+            <a:endParaRPr lang="en-US" dirty="0"/>
+          </a:p>
+        </p:txBody>
+      </p:sp>
+      <p:sp>
+        <p:nvSpPr>
+          <p:cNvPr id="4" name="Slide Number Placeholder 3"/>
+          <p:cNvSpPr>
+            <a:spLocks noGrp="1"/>
+          </p:cNvSpPr>
+          <p:nvPr>
+            <p:ph type="sldNum" sz="quarter" idx="10"/>
+          </p:nvPr>
+        </p:nvSpPr>
+        <p:spPr/>
+        <p:txBody>
+          <a:bodyPr/>
+          <a:lstStyle/>
+          <a:p>
+            <a:fld id="{C26C7087-2709-BC41-8126-395A8083CFA3}" type="slidenum">
+              <a:rPr lang="en-US" smtClean="0"/>
+              <a:t>10</a:t>
+            </a:fld>
+            <a:endParaRPr lang="en-US"/>
+          </a:p>
+        </p:txBody>
+      </p:sp>
+    </p:spTree>
+    <p:extLst>
+      <p:ext uri="{BB962C8B-B14F-4D97-AF65-F5344CB8AC3E}">
+        <p14:creationId xmlns:p14="http://schemas.microsoft.com/office/powerpoint/2010/main" val="971203016"/>
+      </p:ext>
+    </p:extLst>
+  </p:cSld>
+  <p:clrMapOvr>
+    <a:masterClrMapping/>
+  </p:clrMapOvr>
+</p:notes>
+</file>
+
 <file path=ppt/slideLayouts/slideLayout1.xml><?xml version="1.0" encoding="utf-8"?>
 <p:sldLayout xmlns:a="http://schemas.openxmlformats.org/drawingml/2006/main" xmlns:r="http://schemas.openxmlformats.org/officeDocument/2006/relationships" xmlns:p="http://schemas.openxmlformats.org/presentationml/2006/main" type="title" preserve="1">
   <p:cSld name="Title Slide">
@@ -823,7 +924,7 @@
           <a:p>
             <a:fld id="{0770D71F-E974-AC42-811A-A795B9D7A8E9}" type="datetime1">
               <a:rPr lang="en-US" smtClean="0"/>
-              <a:t>10/30/15</a:t>
+              <a:t>11/8/15</a:t>
             </a:fld>
             <a:endParaRPr lang="en-US"/>
           </a:p>
@@ -993,7 +1094,7 @@
           <a:p>
             <a:fld id="{E74ECA1E-5296-0240-8B14-4B2504E41286}" type="datetime1">
               <a:rPr lang="en-US" smtClean="0"/>
-              <a:t>10/30/15</a:t>
+              <a:t>11/8/15</a:t>
             </a:fld>
             <a:endParaRPr lang="en-US"/>
           </a:p>
@@ -1173,7 +1274,7 @@
           <a:p>
             <a:fld id="{8D67B787-06E5-0D41-9E4A-98A3B7F09546}" type="datetime1">
               <a:rPr lang="en-US" smtClean="0"/>
-              <a:t>10/30/15</a:t>
+              <a:t>11/8/15</a:t>
             </a:fld>
             <a:endParaRPr lang="en-US"/>
           </a:p>
@@ -1343,7 +1444,7 @@
           <a:p>
             <a:fld id="{64812655-7427-DB4F-8142-E62E8D4071E3}" type="datetime1">
               <a:rPr lang="en-US" smtClean="0"/>
-              <a:t>10/30/15</a:t>
+              <a:t>11/8/15</a:t>
             </a:fld>
             <a:endParaRPr lang="en-US"/>
           </a:p>
@@ -1589,7 +1690,7 @@
           <a:p>
             <a:fld id="{FBEC6C3E-CFC5-414E-AEC5-678693EBDFA7}" type="datetime1">
               <a:rPr lang="en-US" smtClean="0"/>
-              <a:t>10/30/15</a:t>
+              <a:t>11/8/15</a:t>
             </a:fld>
             <a:endParaRPr lang="en-US"/>
           </a:p>
@@ -1877,7 +1978,7 @@
           <a:p>
             <a:fld id="{90E8FDF5-C9F6-1245-8EF8-E1E04527BC7C}" type="datetime1">
               <a:rPr lang="en-US" smtClean="0"/>
-              <a:t>10/30/15</a:t>
+              <a:t>11/8/15</a:t>
             </a:fld>
             <a:endParaRPr lang="en-US"/>
           </a:p>
@@ -2299,7 +2400,7 @@
           <a:p>
             <a:fld id="{F9D2F6D1-D64F-5F46-85F2-B1DFBEE6EC18}" type="datetime1">
               <a:rPr lang="en-US" smtClean="0"/>
-              <a:t>10/30/15</a:t>
+              <a:t>11/8/15</a:t>
             </a:fld>
             <a:endParaRPr lang="en-US"/>
           </a:p>
@@ -2417,7 +2518,7 @@
           <a:p>
             <a:fld id="{A016C0FE-B599-3D45-A35C-844187A5F763}" type="datetime1">
               <a:rPr lang="en-US" smtClean="0"/>
-              <a:t>10/30/15</a:t>
+              <a:t>11/8/15</a:t>
             </a:fld>
             <a:endParaRPr lang="en-US"/>
           </a:p>
@@ -2512,7 +2613,7 @@
           <a:p>
             <a:fld id="{978A69D7-AD60-2B4C-8FBA-4F8FABCDF0A2}" type="datetime1">
               <a:rPr lang="en-US" smtClean="0"/>
-              <a:t>10/30/15</a:t>
+              <a:t>11/8/15</a:t>
             </a:fld>
             <a:endParaRPr lang="en-US"/>
           </a:p>
@@ -2789,7 +2890,7 @@
           <a:p>
             <a:fld id="{99E2344C-EAA6-6549-AFA5-6DFF1CBE7F86}" type="datetime1">
               <a:rPr lang="en-US" smtClean="0"/>
-              <a:t>10/30/15</a:t>
+              <a:t>11/8/15</a:t>
             </a:fld>
             <a:endParaRPr lang="en-US"/>
           </a:p>
@@ -3042,7 +3143,7 @@
           <a:p>
             <a:fld id="{5BBB1660-9448-CA48-97FE-A4A9B87E18B1}" type="datetime1">
               <a:rPr lang="en-US" smtClean="0"/>
-              <a:t>10/30/15</a:t>
+              <a:t>11/8/15</a:t>
             </a:fld>
             <a:endParaRPr lang="en-US"/>
           </a:p>
@@ -3255,7 +3356,7 @@
           <a:p>
             <a:fld id="{B249E575-9FD6-B34A-9C7E-B05D22E48F70}" type="datetime1">
               <a:rPr lang="en-US" smtClean="0"/>
-              <a:t>10/30/15</a:t>
+              <a:t>11/8/15</a:t>
             </a:fld>
             <a:endParaRPr lang="en-US"/>
           </a:p>
@@ -3686,7 +3787,11 @@
           <a:p>
             <a:r>
               <a:rPr lang="en-US" dirty="0" smtClean="0"/>
-              <a:t>Jul 28, 2015</a:t>
+              <a:t>Nov 8, </a:t>
+            </a:r>
+            <a:r>
+              <a:rPr lang="en-US" dirty="0" smtClean="0"/>
+              <a:t>2015</a:t>
             </a:r>
             <a:endParaRPr lang="en-US" dirty="0"/>
           </a:p>
@@ -3762,36 +3867,12 @@
             <p:ph type="title"/>
           </p:nvPr>
         </p:nvSpPr>
-        <p:spPr/>
-        <p:txBody>
-          <a:bodyPr>
-            <a:normAutofit fontScale="90000"/>
-          </a:bodyPr>
-          <a:lstStyle/>
-          <a:p>
-            <a:r>
-              <a:rPr lang="en-US" dirty="0" smtClean="0"/>
-              <a:t>Implementation Components - </a:t>
-            </a:r>
-            <a:r>
-              <a:rPr lang="en-US" dirty="0" err="1" smtClean="0"/>
-              <a:t>cont</a:t>
-            </a:r>
-            <a:endParaRPr lang="en-US" dirty="0"/>
-          </a:p>
-        </p:txBody>
-      </p:sp>
-      <p:sp>
-        <p:nvSpPr>
-          <p:cNvPr id="3" name="Content Placeholder 2"/>
-          <p:cNvSpPr>
-            <a:spLocks noGrp="1"/>
-          </p:cNvSpPr>
-          <p:nvPr>
-            <p:ph idx="1"/>
-          </p:nvPr>
-        </p:nvSpPr>
-        <p:spPr/>
+        <p:spPr>
+          <a:xfrm>
+            <a:off x="457200" y="23958"/>
+            <a:ext cx="8229600" cy="1143000"/>
+          </a:xfrm>
+        </p:spPr>
         <p:txBody>
           <a:bodyPr>
             <a:normAutofit/>
@@ -3800,53 +3881,164 @@
           <a:p>
             <a:r>
               <a:rPr lang="en-US" dirty="0" smtClean="0"/>
-              <a:t>BMS nodes</a:t>
-            </a:r>
-          </a:p>
-          <a:p>
-            <a:pPr lvl="1"/>
-            <a:r>
-              <a:rPr lang="en-US" dirty="0" err="1" smtClean="0"/>
-              <a:t>PyNDN</a:t>
-            </a:r>
-            <a:r>
-              <a:rPr lang="en-US" dirty="0" smtClean="0"/>
-              <a:t> applications running on mini-</a:t>
-            </a:r>
-            <a:r>
-              <a:rPr lang="en-US" dirty="0" err="1" smtClean="0"/>
+              <a:t>Access control – </a:t>
+            </a:r>
+            <a:r>
+              <a:rPr lang="en-US" dirty="0" smtClean="0"/>
+              <a:t>example API calls</a:t>
+            </a:r>
+            <a:endParaRPr lang="en-US" dirty="0"/>
+          </a:p>
+        </p:txBody>
+      </p:sp>
+      <p:sp>
+        <p:nvSpPr>
+          <p:cNvPr id="3" name="Content Placeholder 2"/>
+          <p:cNvSpPr>
+            <a:spLocks noGrp="1"/>
+          </p:cNvSpPr>
+          <p:nvPr>
+            <p:ph idx="1"/>
+          </p:nvPr>
+        </p:nvSpPr>
+        <p:spPr>
+          <a:xfrm>
+            <a:off x="340237" y="1015276"/>
+            <a:ext cx="8686800" cy="2367091"/>
+          </a:xfrm>
+        </p:spPr>
+        <p:txBody>
+          <a:bodyPr>
+            <a:normAutofit fontScale="92500" lnSpcReduction="10000"/>
+          </a:bodyPr>
+          <a:lstStyle/>
+          <a:p>
+            <a:r>
+              <a:rPr lang="en-US" dirty="0" smtClean="0"/>
+              <a:t>For </a:t>
+            </a:r>
+            <a:r>
+              <a:rPr lang="en-US" dirty="0" smtClean="0"/>
+              <a:t>example, </a:t>
+            </a:r>
+            <a:r>
+              <a:rPr lang="en-US" dirty="0" smtClean="0"/>
+              <a:t>content </a:t>
+            </a:r>
+            <a:r>
+              <a:rPr lang="en-US" dirty="0" smtClean="0"/>
+              <a:t>name</a:t>
+            </a:r>
+          </a:p>
+          <a:p>
+            <a:pPr marL="0" indent="0">
+              <a:buNone/>
+            </a:pPr>
+            <a:r>
+              <a:rPr lang="en-US" sz="2800" dirty="0" smtClean="0"/>
+              <a:t>“/</a:t>
+            </a:r>
+            <a:r>
+              <a:rPr lang="en-US" sz="2800" dirty="0" err="1" smtClean="0"/>
               <a:t>ndn</a:t>
             </a:r>
+            <a:r>
+              <a:rPr lang="en-US" sz="2800" dirty="0" smtClean="0"/>
+              <a:t>/app/</a:t>
+            </a:r>
+            <a:r>
+              <a:rPr lang="en-US" sz="2800" dirty="0" err="1" smtClean="0"/>
+              <a:t>bms</a:t>
+            </a:r>
+            <a:r>
+              <a:rPr lang="en-US" sz="2800" dirty="0" smtClean="0"/>
+              <a:t>/</a:t>
+            </a:r>
+            <a:r>
+              <a:rPr lang="en-US" sz="2800" dirty="0" err="1" smtClean="0"/>
+              <a:t>ucla</a:t>
+            </a:r>
+            <a:r>
+              <a:rPr lang="en-US" sz="2800" dirty="0" smtClean="0"/>
+              <a:t>/</a:t>
+            </a:r>
+            <a:r>
+              <a:rPr lang="en-US" sz="2800" dirty="0" err="1" smtClean="0"/>
+              <a:t>Melnitz</a:t>
+            </a:r>
+            <a:r>
+              <a:rPr lang="en-US" sz="2800" dirty="0" smtClean="0"/>
+              <a:t>/1469A/xfmr-6.dmd.inst/data/Electricity/Aggregation/</a:t>
+            </a:r>
+            <a:r>
+              <a:rPr lang="en-US" sz="2800" dirty="0" err="1" smtClean="0"/>
+              <a:t>avg</a:t>
+            </a:r>
+            <a:r>
+              <a:rPr lang="en-US" sz="2800" dirty="0" smtClean="0"/>
+              <a:t>/</a:t>
+            </a:r>
+            <a:r>
+              <a:rPr lang="en-US" sz="2800" dirty="0" smtClean="0"/>
+              <a:t>1440460800000/1440460801000</a:t>
+            </a:r>
+            <a:r>
+              <a:rPr lang="en-US" sz="2800" dirty="0"/>
+              <a:t>”</a:t>
+            </a:r>
+            <a:endParaRPr lang="en-US" sz="2800" dirty="0" smtClean="0"/>
+          </a:p>
+          <a:p>
+            <a:r>
+              <a:rPr lang="en-US" dirty="0" smtClean="0"/>
+              <a:t>Primary group name</a:t>
+            </a:r>
+          </a:p>
+          <a:p>
+            <a:pPr marL="0" indent="0">
+              <a:buNone/>
+            </a:pPr>
+            <a:r>
+              <a:rPr lang="en-US" sz="2800" dirty="0"/>
+              <a:t>“/</a:t>
+            </a:r>
+            <a:r>
+              <a:rPr lang="en-US" sz="2800" dirty="0" err="1"/>
+              <a:t>ndn</a:t>
+            </a:r>
+            <a:r>
+              <a:rPr lang="en-US" sz="2800" dirty="0"/>
+              <a:t>/app/</a:t>
+            </a:r>
+            <a:r>
+              <a:rPr lang="en-US" sz="2800" dirty="0" err="1"/>
+              <a:t>bms</a:t>
+            </a:r>
+            <a:r>
+              <a:rPr lang="en-US" sz="2800" dirty="0"/>
+              <a:t>/</a:t>
+            </a:r>
+            <a:r>
+              <a:rPr lang="en-US" sz="2800" dirty="0" err="1"/>
+              <a:t>ucla</a:t>
+            </a:r>
+            <a:r>
+              <a:rPr lang="en-US" sz="2800" dirty="0"/>
+              <a:t>/</a:t>
+            </a:r>
+            <a:r>
+              <a:rPr lang="en-US" sz="2800" dirty="0" err="1"/>
+              <a:t>Melnitz</a:t>
+            </a:r>
+            <a:r>
+              <a:rPr lang="en-US" sz="2800" dirty="0"/>
+              <a:t>/1469A/data/</a:t>
+            </a:r>
+            <a:r>
+              <a:rPr lang="en-US" sz="2800" dirty="0" smtClean="0"/>
+              <a:t>Electricity”</a:t>
+            </a:r>
             <a:endParaRPr lang="en-US" dirty="0" smtClean="0"/>
-          </a:p>
-          <a:p>
-            <a:pPr lvl="1"/>
-            <a:r>
-              <a:rPr lang="en-US" dirty="0" smtClean="0"/>
-              <a:t>Three levels of BMS nodes (building, room, device); each node has its own </a:t>
-            </a:r>
-            <a:r>
-              <a:rPr lang="en-US" dirty="0" err="1" smtClean="0"/>
-              <a:t>nfd</a:t>
-            </a:r>
-            <a:r>
-              <a:rPr lang="en-US" dirty="0" smtClean="0"/>
-              <a:t> and BMS node processes; routes are statically configured</a:t>
-            </a:r>
-          </a:p>
-          <a:p>
-            <a:pPr lvl="1"/>
-            <a:r>
-              <a:rPr lang="en-US" dirty="0" smtClean="0"/>
-              <a:t>Panel-level nodes collect data from sensor gateway nodes</a:t>
-            </a:r>
-          </a:p>
-          <a:p>
-            <a:r>
-              <a:rPr lang="en-US" dirty="0" smtClean="0"/>
-              <a:t>Browser interface for data visualization: NDN-JS</a:t>
-            </a:r>
-            <a:endParaRPr lang="en-US" dirty="0"/>
           </a:p>
         </p:txBody>
       </p:sp>
@@ -3873,10 +4065,40 @@
           </a:p>
         </p:txBody>
       </p:sp>
+      <p:pic>
+        <p:nvPicPr>
+          <p:cNvPr id="6" name="Picture 5" descr="gbe-api-calls.png"/>
+          <p:cNvPicPr>
+            <a:picLocks noChangeAspect="1"/>
+          </p:cNvPicPr>
+          <p:nvPr/>
+        </p:nvPicPr>
+        <p:blipFill>
+          <a:blip r:embed="rId3">
+            <a:extLst>
+              <a:ext uri="{28A0092B-C50C-407E-A947-70E740481C1C}">
+                <a14:useLocalDpi xmlns:a14="http://schemas.microsoft.com/office/drawing/2010/main" val="0"/>
+              </a:ext>
+            </a:extLst>
+          </a:blip>
+          <a:stretch>
+            <a:fillRect/>
+          </a:stretch>
+        </p:blipFill>
+        <p:spPr>
+          <a:xfrm>
+            <a:off x="943595" y="3245842"/>
+            <a:ext cx="7114319" cy="3475633"/>
+          </a:xfrm>
+          <a:prstGeom prst="rect">
+            <a:avLst/>
+          </a:prstGeom>
+        </p:spPr>
+      </p:pic>
     </p:spTree>
     <p:extLst>
       <p:ext uri="{BB962C8B-B14F-4D97-AF65-F5344CB8AC3E}">
-        <p14:creationId xmlns:p14="http://schemas.microsoft.com/office/powerpoint/2010/main" val="703651535"/>
+        <p14:creationId xmlns:p14="http://schemas.microsoft.com/office/powerpoint/2010/main" val="3870573126"/>
       </p:ext>
     </p:extLst>
   </p:cSld>
@@ -3927,7 +4149,11 @@
           <a:p>
             <a:r>
               <a:rPr lang="en-US" dirty="0" smtClean="0"/>
-              <a:t>Current Progress</a:t>
+              <a:t>Group based access control – </a:t>
+            </a:r>
+            <a:r>
+              <a:rPr lang="en-US" dirty="0" err="1" smtClean="0"/>
+              <a:t>cont</a:t>
             </a:r>
             <a:endParaRPr lang="en-US" dirty="0"/>
           </a:p>
@@ -3949,46 +4175,23 @@
           <a:lstStyle/>
           <a:p>
             <a:r>
-              <a:rPr lang="en-US" dirty="0" smtClean="0"/>
-              <a:t>Current implementation has</a:t>
+              <a:rPr lang="en-US" dirty="0"/>
+              <a:t>Adding identities to a group</a:t>
             </a:r>
           </a:p>
           <a:p>
             <a:pPr lvl="1"/>
             <a:r>
-              <a:rPr lang="en-US" dirty="0" smtClean="0"/>
-              <a:t>Gateway publisher (working on real time data)</a:t>
+              <a:rPr lang="en-US" dirty="0"/>
+              <a:t>Upon receiving “group add” command data (signed by an authorized manager)</a:t>
             </a:r>
           </a:p>
           <a:p>
             <a:pPr lvl="1"/>
             <a:r>
-              <a:rPr lang="en-US" dirty="0" smtClean="0"/>
-              <a:t>BMS nodes running in mini-</a:t>
-            </a:r>
-            <a:r>
-              <a:rPr lang="en-US" dirty="0" err="1" smtClean="0"/>
-              <a:t>ndn</a:t>
-            </a:r>
-            <a:endParaRPr lang="en-US" dirty="0"/>
-          </a:p>
-          <a:p>
-            <a:r>
-              <a:rPr lang="en-US" dirty="0" err="1" smtClean="0"/>
-              <a:t>Todo</a:t>
-            </a:r>
-            <a:endParaRPr lang="en-US" dirty="0"/>
-          </a:p>
-          <a:p>
-            <a:pPr lvl="1"/>
-            <a:r>
-              <a:rPr lang="en-US" dirty="0" smtClean="0"/>
-              <a:t>Group based access control</a:t>
-            </a:r>
-          </a:p>
-          <a:p>
-            <a:pPr lvl="1"/>
-            <a:endParaRPr lang="en-US" dirty="0" smtClean="0"/>
+              <a:rPr lang="en-US" dirty="0"/>
+              <a:t>Group generates missing E/D-Keys based on the schedule indicated in the command data</a:t>
+            </a:r>
           </a:p>
         </p:txBody>
       </p:sp>
@@ -4018,13 +4221,20 @@
     </p:spTree>
     <p:extLst>
       <p:ext uri="{BB962C8B-B14F-4D97-AF65-F5344CB8AC3E}">
-        <p14:creationId xmlns:p14="http://schemas.microsoft.com/office/powerpoint/2010/main" val="674880477"/>
+        <p14:creationId xmlns:p14="http://schemas.microsoft.com/office/powerpoint/2010/main" val="19073152"/>
       </p:ext>
     </p:extLst>
   </p:cSld>
   <p:clrMapOvr>
     <a:masterClrMapping/>
   </p:clrMapOvr>
+  <p:timing>
+    <p:tnLst>
+      <p:par>
+        <p:cTn xmlns:p14="http://schemas.microsoft.com/office/powerpoint/2010/main" id="1" dur="indefinite" restart="never" nodeType="tmRoot"/>
+      </p:par>
+    </p:tnLst>
+  </p:timing>
 </p:sld>
 </file>
 
@@ -4055,57 +4265,138 @@
             <p:ph type="title"/>
           </p:nvPr>
         </p:nvSpPr>
+        <p:spPr/>
+        <p:txBody>
+          <a:bodyPr/>
+          <a:lstStyle/>
+          <a:p>
+            <a:r>
+              <a:rPr lang="en-US" dirty="0" smtClean="0"/>
+              <a:t>Implementation </a:t>
+            </a:r>
+            <a:r>
+              <a:rPr lang="en-US" dirty="0" smtClean="0"/>
+              <a:t>components</a:t>
+            </a:r>
+            <a:endParaRPr lang="en-US" dirty="0"/>
+          </a:p>
+        </p:txBody>
+      </p:sp>
+      <p:sp>
+        <p:nvSpPr>
+          <p:cNvPr id="5" name="Slide Number Placeholder 4"/>
+          <p:cNvSpPr>
+            <a:spLocks noGrp="1"/>
+          </p:cNvSpPr>
+          <p:nvPr>
+            <p:ph type="sldNum" sz="quarter" idx="12"/>
+          </p:nvPr>
+        </p:nvSpPr>
+        <p:spPr/>
+        <p:txBody>
+          <a:bodyPr/>
+          <a:lstStyle/>
+          <a:p>
+            <a:fld id="{2A6259AD-43E4-E44A-87BB-B535EA9DBBCD}" type="slidenum">
+              <a:rPr lang="en-US" smtClean="0"/>
+              <a:t>12</a:t>
+            </a:fld>
+            <a:endParaRPr lang="en-US"/>
+          </a:p>
+        </p:txBody>
+      </p:sp>
+      <p:pic>
+        <p:nvPicPr>
+          <p:cNvPr id="3" name="Picture 2" descr="bms-nodes-structure.pdf"/>
+          <p:cNvPicPr>
+            <a:picLocks noChangeAspect="1"/>
+          </p:cNvPicPr>
+          <p:nvPr/>
+        </p:nvPicPr>
+        <p:blipFill>
+          <a:blip r:embed="rId2">
+            <a:extLst>
+              <a:ext uri="{28A0092B-C50C-407E-A947-70E740481C1C}">
+                <a14:useLocalDpi xmlns:a14="http://schemas.microsoft.com/office/drawing/2010/main" val="0"/>
+              </a:ext>
+            </a:extLst>
+          </a:blip>
+          <a:stretch>
+            <a:fillRect/>
+          </a:stretch>
+        </p:blipFill>
         <p:spPr>
           <a:xfrm>
-            <a:off x="457200" y="2708924"/>
-            <a:ext cx="8229600" cy="1143000"/>
+            <a:off x="1238430" y="1181101"/>
+            <a:ext cx="6654396" cy="4569148"/>
+          </a:xfrm>
+          <a:prstGeom prst="rect">
+            <a:avLst/>
+          </a:prstGeom>
+        </p:spPr>
+      </p:pic>
+      <p:sp>
+        <p:nvSpPr>
+          <p:cNvPr id="6" name="Content Placeholder 2"/>
+          <p:cNvSpPr>
+            <a:spLocks noGrp="1"/>
+          </p:cNvSpPr>
+          <p:nvPr>
+            <p:ph idx="1"/>
+          </p:nvPr>
+        </p:nvSpPr>
+        <p:spPr>
+          <a:xfrm>
+            <a:off x="457200" y="5780340"/>
+            <a:ext cx="8229600" cy="719228"/>
           </a:xfrm>
         </p:spPr>
         <p:txBody>
-          <a:bodyPr/>
-          <a:lstStyle/>
-          <a:p>
-            <a:r>
-              <a:rPr lang="en-US" dirty="0" smtClean="0"/>
-              <a:t>Thanks</a:t>
-            </a:r>
-            <a:endParaRPr lang="en-US" dirty="0"/>
-          </a:p>
-        </p:txBody>
-      </p:sp>
-      <p:sp>
-        <p:nvSpPr>
-          <p:cNvPr id="3" name="Slide Number Placeholder 2"/>
-          <p:cNvSpPr>
-            <a:spLocks noGrp="1"/>
-          </p:cNvSpPr>
-          <p:nvPr>
-            <p:ph type="sldNum" sz="quarter" idx="12"/>
-          </p:nvPr>
-        </p:nvSpPr>
-        <p:spPr/>
-        <p:txBody>
-          <a:bodyPr/>
-          <a:lstStyle/>
-          <a:p>
-            <a:fld id="{2A6259AD-43E4-E44A-87BB-B535EA9DBBCD}" type="slidenum">
-              <a:rPr lang="en-US" smtClean="0"/>
-              <a:t>12</a:t>
-            </a:fld>
-            <a:endParaRPr lang="en-US"/>
+          <a:bodyPr>
+            <a:normAutofit fontScale="77500" lnSpcReduction="20000"/>
+          </a:bodyPr>
+          <a:lstStyle/>
+          <a:p>
+            <a:pPr marL="0" indent="0">
+              <a:buNone/>
+            </a:pPr>
+            <a:r>
+              <a:rPr lang="en-US" dirty="0" smtClean="0"/>
+              <a:t>(Each line is a </a:t>
+            </a:r>
+            <a:r>
+              <a:rPr lang="en-US" dirty="0"/>
+              <a:t>face from parent node to child node, with child's prefix </a:t>
+            </a:r>
+            <a:r>
+              <a:rPr lang="en-US" dirty="0" smtClean="0"/>
+              <a:t>registered)</a:t>
+            </a:r>
+            <a:endParaRPr lang="en-US" dirty="0" smtClean="0">
+              <a:solidFill>
+                <a:srgbClr val="FF0000"/>
+              </a:solidFill>
+            </a:endParaRPr>
           </a:p>
         </p:txBody>
       </p:sp>
     </p:spTree>
     <p:extLst>
       <p:ext uri="{BB962C8B-B14F-4D97-AF65-F5344CB8AC3E}">
-        <p14:creationId xmlns:p14="http://schemas.microsoft.com/office/powerpoint/2010/main" val="3740786862"/>
+        <p14:creationId xmlns:p14="http://schemas.microsoft.com/office/powerpoint/2010/main" val="3999802342"/>
       </p:ext>
     </p:extLst>
   </p:cSld>
   <p:clrMapOvr>
     <a:masterClrMapping/>
   </p:clrMapOvr>
+  <p:timing>
+    <p:tnLst>
+      <p:par>
+        <p:cTn xmlns:p14="http://schemas.microsoft.com/office/powerpoint/2010/main" id="1" dur="indefinite" restart="never" nodeType="tmRoot"/>
+      </p:par>
+    </p:tnLst>
+  </p:timing>
 </p:sld>
 </file>
 
@@ -4138,6 +4429,414 @@
         </p:nvSpPr>
         <p:spPr/>
         <p:txBody>
+          <a:bodyPr>
+            <a:normAutofit fontScale="90000"/>
+          </a:bodyPr>
+          <a:lstStyle/>
+          <a:p>
+            <a:r>
+              <a:rPr lang="en-US" dirty="0" smtClean="0"/>
+              <a:t>Implementation </a:t>
+            </a:r>
+            <a:r>
+              <a:rPr lang="en-US" dirty="0" smtClean="0"/>
+              <a:t>components </a:t>
+            </a:r>
+            <a:r>
+              <a:rPr lang="en-US" dirty="0" smtClean="0"/>
+              <a:t>- </a:t>
+            </a:r>
+            <a:r>
+              <a:rPr lang="en-US" dirty="0" err="1" smtClean="0"/>
+              <a:t>cont</a:t>
+            </a:r>
+            <a:endParaRPr lang="en-US" dirty="0"/>
+          </a:p>
+        </p:txBody>
+      </p:sp>
+      <p:sp>
+        <p:nvSpPr>
+          <p:cNvPr id="3" name="Content Placeholder 2"/>
+          <p:cNvSpPr>
+            <a:spLocks noGrp="1"/>
+          </p:cNvSpPr>
+          <p:nvPr>
+            <p:ph idx="1"/>
+          </p:nvPr>
+        </p:nvSpPr>
+        <p:spPr/>
+        <p:txBody>
+          <a:bodyPr>
+            <a:normAutofit/>
+          </a:bodyPr>
+          <a:lstStyle/>
+          <a:p>
+            <a:r>
+              <a:rPr lang="en-US" dirty="0" smtClean="0"/>
+              <a:t>BMS nodes</a:t>
+            </a:r>
+          </a:p>
+          <a:p>
+            <a:pPr lvl="1"/>
+            <a:r>
+              <a:rPr lang="en-US" dirty="0" err="1" smtClean="0"/>
+              <a:t>PyNDN</a:t>
+            </a:r>
+            <a:r>
+              <a:rPr lang="en-US" dirty="0" smtClean="0"/>
+              <a:t> applications running on mini-</a:t>
+            </a:r>
+            <a:r>
+              <a:rPr lang="en-US" dirty="0" err="1" smtClean="0"/>
+              <a:t>ndn</a:t>
+            </a:r>
+            <a:endParaRPr lang="en-US" dirty="0" smtClean="0"/>
+          </a:p>
+          <a:p>
+            <a:pPr lvl="1"/>
+            <a:r>
+              <a:rPr lang="en-US" dirty="0" smtClean="0"/>
+              <a:t>Three levels of BMS nodes (building, room, device); each node has its own </a:t>
+            </a:r>
+            <a:r>
+              <a:rPr lang="en-US" dirty="0" err="1" smtClean="0"/>
+              <a:t>nfd</a:t>
+            </a:r>
+            <a:r>
+              <a:rPr lang="en-US" dirty="0" smtClean="0"/>
+              <a:t> and BMS node processes; routes are statically configured</a:t>
+            </a:r>
+          </a:p>
+          <a:p>
+            <a:pPr lvl="1"/>
+            <a:r>
+              <a:rPr lang="en-US" dirty="0" smtClean="0"/>
+              <a:t>Panel-level nodes collect data from sensor gateway nodes</a:t>
+            </a:r>
+          </a:p>
+          <a:p>
+            <a:r>
+              <a:rPr lang="en-US" dirty="0" smtClean="0"/>
+              <a:t>Browser interface for data visualization: NDN-JS</a:t>
+            </a:r>
+            <a:endParaRPr lang="en-US" dirty="0"/>
+          </a:p>
+        </p:txBody>
+      </p:sp>
+      <p:sp>
+        <p:nvSpPr>
+          <p:cNvPr id="4" name="Slide Number Placeholder 3"/>
+          <p:cNvSpPr>
+            <a:spLocks noGrp="1"/>
+          </p:cNvSpPr>
+          <p:nvPr>
+            <p:ph type="sldNum" sz="quarter" idx="12"/>
+          </p:nvPr>
+        </p:nvSpPr>
+        <p:spPr/>
+        <p:txBody>
+          <a:bodyPr/>
+          <a:lstStyle/>
+          <a:p>
+            <a:fld id="{2A6259AD-43E4-E44A-87BB-B535EA9DBBCD}" type="slidenum">
+              <a:rPr lang="en-US" smtClean="0"/>
+              <a:t>13</a:t>
+            </a:fld>
+            <a:endParaRPr lang="en-US"/>
+          </a:p>
+        </p:txBody>
+      </p:sp>
+    </p:spTree>
+    <p:extLst>
+      <p:ext uri="{BB962C8B-B14F-4D97-AF65-F5344CB8AC3E}">
+        <p14:creationId xmlns:p14="http://schemas.microsoft.com/office/powerpoint/2010/main" val="703651535"/>
+      </p:ext>
+    </p:extLst>
+  </p:cSld>
+  <p:clrMapOvr>
+    <a:masterClrMapping/>
+  </p:clrMapOvr>
+  <p:timing>
+    <p:tnLst>
+      <p:par>
+        <p:cTn xmlns:p14="http://schemas.microsoft.com/office/powerpoint/2010/main" id="1" dur="indefinite" restart="never" nodeType="tmRoot"/>
+      </p:par>
+    </p:tnLst>
+  </p:timing>
+</p:sld>
+</file>
+
+<file path=ppt/slides/slide14.xml><?xml version="1.0" encoding="utf-8"?>
+<p:sld xmlns:a="http://schemas.openxmlformats.org/drawingml/2006/main" xmlns:r="http://schemas.openxmlformats.org/officeDocument/2006/relationships" xmlns:p="http://schemas.openxmlformats.org/presentationml/2006/main">
+  <p:cSld>
+    <p:spTree>
+      <p:nvGrpSpPr>
+        <p:cNvPr id="1" name=""/>
+        <p:cNvGrpSpPr/>
+        <p:nvPr/>
+      </p:nvGrpSpPr>
+      <p:grpSpPr>
+        <a:xfrm>
+          <a:off x="0" y="0"/>
+          <a:ext cx="0" cy="0"/>
+          <a:chOff x="0" y="0"/>
+          <a:chExt cx="0" cy="0"/>
+        </a:xfrm>
+      </p:grpSpPr>
+      <p:sp>
+        <p:nvSpPr>
+          <p:cNvPr id="2" name="Title 1"/>
+          <p:cNvSpPr>
+            <a:spLocks noGrp="1"/>
+          </p:cNvSpPr>
+          <p:nvPr>
+            <p:ph type="title"/>
+          </p:nvPr>
+        </p:nvSpPr>
+        <p:spPr/>
+        <p:txBody>
+          <a:bodyPr/>
+          <a:lstStyle/>
+          <a:p>
+            <a:r>
+              <a:rPr lang="en-US" dirty="0" smtClean="0"/>
+              <a:t>Current </a:t>
+            </a:r>
+            <a:r>
+              <a:rPr lang="en-US" dirty="0" smtClean="0"/>
+              <a:t>progress</a:t>
+            </a:r>
+            <a:endParaRPr lang="en-US" dirty="0"/>
+          </a:p>
+        </p:txBody>
+      </p:sp>
+      <p:sp>
+        <p:nvSpPr>
+          <p:cNvPr id="3" name="Content Placeholder 2"/>
+          <p:cNvSpPr>
+            <a:spLocks noGrp="1"/>
+          </p:cNvSpPr>
+          <p:nvPr>
+            <p:ph idx="1"/>
+          </p:nvPr>
+        </p:nvSpPr>
+        <p:spPr/>
+        <p:txBody>
+          <a:bodyPr/>
+          <a:lstStyle/>
+          <a:p>
+            <a:r>
+              <a:rPr lang="en-US" dirty="0" smtClean="0"/>
+              <a:t>Current implementation has</a:t>
+            </a:r>
+          </a:p>
+          <a:p>
+            <a:pPr lvl="1"/>
+            <a:r>
+              <a:rPr lang="en-US" dirty="0" smtClean="0"/>
+              <a:t>Gateway publisher (working on real time data)</a:t>
+            </a:r>
+          </a:p>
+          <a:p>
+            <a:pPr lvl="1"/>
+            <a:r>
+              <a:rPr lang="en-US" dirty="0" smtClean="0"/>
+              <a:t>BMS nodes running in mini-</a:t>
+            </a:r>
+            <a:r>
+              <a:rPr lang="en-US" dirty="0" err="1" smtClean="0"/>
+              <a:t>ndn</a:t>
+            </a:r>
+            <a:endParaRPr lang="en-US" dirty="0"/>
+          </a:p>
+          <a:p>
+            <a:r>
+              <a:rPr lang="en-US" dirty="0" err="1" smtClean="0"/>
+              <a:t>Todo</a:t>
+            </a:r>
+            <a:endParaRPr lang="en-US" dirty="0"/>
+          </a:p>
+          <a:p>
+            <a:pPr lvl="1"/>
+            <a:r>
+              <a:rPr lang="en-US" dirty="0" smtClean="0"/>
+              <a:t>Group based access </a:t>
+            </a:r>
+            <a:r>
+              <a:rPr lang="en-US" dirty="0" smtClean="0"/>
+              <a:t>control</a:t>
+            </a:r>
+          </a:p>
+          <a:p>
+            <a:pPr lvl="1"/>
+            <a:r>
+              <a:rPr lang="en-US" dirty="0" smtClean="0"/>
+              <a:t>Resume connection to real data</a:t>
+            </a:r>
+            <a:endParaRPr lang="en-US" dirty="0" smtClean="0"/>
+          </a:p>
+        </p:txBody>
+      </p:sp>
+      <p:sp>
+        <p:nvSpPr>
+          <p:cNvPr id="4" name="Slide Number Placeholder 3"/>
+          <p:cNvSpPr>
+            <a:spLocks noGrp="1"/>
+          </p:cNvSpPr>
+          <p:nvPr>
+            <p:ph type="sldNum" sz="quarter" idx="12"/>
+          </p:nvPr>
+        </p:nvSpPr>
+        <p:spPr/>
+        <p:txBody>
+          <a:bodyPr/>
+          <a:lstStyle/>
+          <a:p>
+            <a:fld id="{2A6259AD-43E4-E44A-87BB-B535EA9DBBCD}" type="slidenum">
+              <a:rPr lang="en-US" smtClean="0"/>
+              <a:t>14</a:t>
+            </a:fld>
+            <a:endParaRPr lang="en-US"/>
+          </a:p>
+        </p:txBody>
+      </p:sp>
+    </p:spTree>
+    <p:extLst>
+      <p:ext uri="{BB962C8B-B14F-4D97-AF65-F5344CB8AC3E}">
+        <p14:creationId xmlns:p14="http://schemas.microsoft.com/office/powerpoint/2010/main" val="674880477"/>
+      </p:ext>
+    </p:extLst>
+  </p:cSld>
+  <p:clrMapOvr>
+    <a:masterClrMapping/>
+  </p:clrMapOvr>
+  <p:timing>
+    <p:tnLst>
+      <p:par>
+        <p:cTn xmlns:p14="http://schemas.microsoft.com/office/powerpoint/2010/main" id="1" dur="indefinite" restart="never" nodeType="tmRoot"/>
+      </p:par>
+    </p:tnLst>
+  </p:timing>
+</p:sld>
+</file>
+
+<file path=ppt/slides/slide15.xml><?xml version="1.0" encoding="utf-8"?>
+<p:sld xmlns:a="http://schemas.openxmlformats.org/drawingml/2006/main" xmlns:r="http://schemas.openxmlformats.org/officeDocument/2006/relationships" xmlns:p="http://schemas.openxmlformats.org/presentationml/2006/main">
+  <p:cSld>
+    <p:spTree>
+      <p:nvGrpSpPr>
+        <p:cNvPr id="1" name=""/>
+        <p:cNvGrpSpPr/>
+        <p:nvPr/>
+      </p:nvGrpSpPr>
+      <p:grpSpPr>
+        <a:xfrm>
+          <a:off x="0" y="0"/>
+          <a:ext cx="0" cy="0"/>
+          <a:chOff x="0" y="0"/>
+          <a:chExt cx="0" cy="0"/>
+        </a:xfrm>
+      </p:grpSpPr>
+      <p:sp>
+        <p:nvSpPr>
+          <p:cNvPr id="2" name="Title 1"/>
+          <p:cNvSpPr>
+            <a:spLocks noGrp="1"/>
+          </p:cNvSpPr>
+          <p:nvPr>
+            <p:ph type="title"/>
+          </p:nvPr>
+        </p:nvSpPr>
+        <p:spPr>
+          <a:xfrm>
+            <a:off x="457200" y="2708924"/>
+            <a:ext cx="8229600" cy="1143000"/>
+          </a:xfrm>
+        </p:spPr>
+        <p:txBody>
+          <a:bodyPr/>
+          <a:lstStyle/>
+          <a:p>
+            <a:r>
+              <a:rPr lang="en-US" dirty="0" smtClean="0"/>
+              <a:t>Thanks</a:t>
+            </a:r>
+            <a:endParaRPr lang="en-US" dirty="0"/>
+          </a:p>
+        </p:txBody>
+      </p:sp>
+      <p:sp>
+        <p:nvSpPr>
+          <p:cNvPr id="3" name="Slide Number Placeholder 2"/>
+          <p:cNvSpPr>
+            <a:spLocks noGrp="1"/>
+          </p:cNvSpPr>
+          <p:nvPr>
+            <p:ph type="sldNum" sz="quarter" idx="12"/>
+          </p:nvPr>
+        </p:nvSpPr>
+        <p:spPr/>
+        <p:txBody>
+          <a:bodyPr/>
+          <a:lstStyle/>
+          <a:p>
+            <a:fld id="{2A6259AD-43E4-E44A-87BB-B535EA9DBBCD}" type="slidenum">
+              <a:rPr lang="en-US" smtClean="0"/>
+              <a:t>15</a:t>
+            </a:fld>
+            <a:endParaRPr lang="en-US"/>
+          </a:p>
+        </p:txBody>
+      </p:sp>
+    </p:spTree>
+    <p:extLst>
+      <p:ext uri="{BB962C8B-B14F-4D97-AF65-F5344CB8AC3E}">
+        <p14:creationId xmlns:p14="http://schemas.microsoft.com/office/powerpoint/2010/main" val="3740786862"/>
+      </p:ext>
+    </p:extLst>
+  </p:cSld>
+  <p:clrMapOvr>
+    <a:masterClrMapping/>
+  </p:clrMapOvr>
+  <p:timing>
+    <p:tnLst>
+      <p:par>
+        <p:cTn xmlns:p14="http://schemas.microsoft.com/office/powerpoint/2010/main" id="1" dur="indefinite" restart="never" nodeType="tmRoot"/>
+      </p:par>
+    </p:tnLst>
+  </p:timing>
+</p:sld>
+</file>
+
+<file path=ppt/slides/slide16.xml><?xml version="1.0" encoding="utf-8"?>
+<p:sld xmlns:a="http://schemas.openxmlformats.org/drawingml/2006/main" xmlns:r="http://schemas.openxmlformats.org/officeDocument/2006/relationships" xmlns:p="http://schemas.openxmlformats.org/presentationml/2006/main">
+  <p:cSld>
+    <p:spTree>
+      <p:nvGrpSpPr>
+        <p:cNvPr id="1" name=""/>
+        <p:cNvGrpSpPr/>
+        <p:nvPr/>
+      </p:nvGrpSpPr>
+      <p:grpSpPr>
+        <a:xfrm>
+          <a:off x="0" y="0"/>
+          <a:ext cx="0" cy="0"/>
+          <a:chOff x="0" y="0"/>
+          <a:chExt cx="0" cy="0"/>
+        </a:xfrm>
+      </p:grpSpPr>
+      <p:sp>
+        <p:nvSpPr>
+          <p:cNvPr id="2" name="Title 1"/>
+          <p:cNvSpPr>
+            <a:spLocks noGrp="1"/>
+          </p:cNvSpPr>
+          <p:nvPr>
+            <p:ph type="title"/>
+          </p:nvPr>
+        </p:nvSpPr>
+        <p:spPr/>
+        <p:txBody>
           <a:bodyPr/>
           <a:lstStyle/>
           <a:p>
@@ -4241,7 +4940,7 @@
           <a:p>
             <a:fld id="{2A6259AD-43E4-E44A-87BB-B535EA9DBBCD}" type="slidenum">
               <a:rPr lang="en-US" smtClean="0"/>
-              <a:t>13</a:t>
+              <a:t>16</a:t>
             </a:fld>
             <a:endParaRPr lang="en-US" dirty="0"/>
           </a:p>
@@ -4294,7 +4993,12 @@
             <p:ph type="title"/>
           </p:nvPr>
         </p:nvSpPr>
-        <p:spPr/>
+        <p:spPr>
+          <a:xfrm>
+            <a:off x="457200" y="23958"/>
+            <a:ext cx="8229600" cy="1143000"/>
+          </a:xfrm>
+        </p:spPr>
         <p:txBody>
           <a:bodyPr/>
           <a:lstStyle/>
@@ -4332,7 +5036,7 @@
       </p:sp>
       <p:pic>
         <p:nvPicPr>
-          <p:cNvPr id="6" name="Picture 5" descr="bms-namespace.pdf"/>
+          <p:cNvPr id="4" name="Picture 3" descr="bms-namespace.pdf"/>
           <p:cNvPicPr>
             <a:picLocks noChangeAspect="1"/>
           </p:cNvPicPr>
@@ -4352,8 +5056,8 @@
         </p:blipFill>
         <p:spPr>
           <a:xfrm>
-            <a:off x="1049170" y="1417638"/>
-            <a:ext cx="6553200" cy="4962135"/>
+            <a:off x="457200" y="1128018"/>
+            <a:ext cx="8365152" cy="5485167"/>
           </a:xfrm>
           <a:prstGeom prst="rect">
             <a:avLst/>
@@ -4407,7 +5111,12 @@
             <p:ph type="title"/>
           </p:nvPr>
         </p:nvSpPr>
-        <p:spPr/>
+        <p:spPr>
+          <a:xfrm>
+            <a:off x="457200" y="23958"/>
+            <a:ext cx="8229600" cy="1143000"/>
+          </a:xfrm>
+        </p:spPr>
         <p:txBody>
           <a:bodyPr>
             <a:normAutofit/>
@@ -4447,7 +5156,7 @@
       </p:sp>
       <p:pic>
         <p:nvPicPr>
-          <p:cNvPr id="22" name="Picture 21" descr="bms-example-name.pdf"/>
+          <p:cNvPr id="6" name="Picture 5" descr="bms-example-name.pdf"/>
           <p:cNvPicPr>
             <a:picLocks noChangeAspect="1"/>
           </p:cNvPicPr>
@@ -4467,8 +5176,8 @@
         </p:blipFill>
         <p:spPr>
           <a:xfrm>
-            <a:off x="1587560" y="1417638"/>
-            <a:ext cx="5729022" cy="5065551"/>
+            <a:off x="1888117" y="965842"/>
+            <a:ext cx="5296753" cy="5734904"/>
           </a:xfrm>
           <a:prstGeom prst="rect">
             <a:avLst/>
@@ -4522,7 +5231,7 @@
           <a:p>
             <a:r>
               <a:rPr lang="en-US" dirty="0" smtClean="0"/>
-              <a:t>Hierarchical storage</a:t>
+              <a:t>Name components</a:t>
             </a:r>
             <a:endParaRPr lang="en-US" dirty="0"/>
           </a:p>
@@ -4541,49 +5250,33 @@
         <p:spPr/>
         <p:txBody>
           <a:bodyPr>
-            <a:normAutofit lnSpcReduction="10000"/>
+            <a:normAutofit fontScale="92500" lnSpcReduction="10000"/>
           </a:bodyPr>
           <a:lstStyle/>
           <a:p>
             <a:r>
               <a:rPr lang="en-US" dirty="0" smtClean="0"/>
-              <a:t>Raw data collected, kept, and batched only at the leaf nodes.</a:t>
-            </a:r>
-          </a:p>
-          <a:p>
-            <a:r>
-              <a:rPr lang="en-US" dirty="0" smtClean="0"/>
-              <a:t>Leaf nodes publish aggregated (min, sum, </a:t>
-            </a:r>
-            <a:r>
-              <a:rPr lang="en-US" dirty="0" err="1" smtClean="0"/>
-              <a:t>avg</a:t>
-            </a:r>
-            <a:r>
-              <a:rPr lang="en-US" dirty="0" smtClean="0"/>
-              <a:t>, </a:t>
-            </a:r>
-            <a:r>
-              <a:rPr lang="en-US" dirty="0" err="1" smtClean="0"/>
-              <a:t>etc</a:t>
-            </a:r>
-            <a:r>
-              <a:rPr lang="en-US" dirty="0" smtClean="0"/>
-              <a:t>) data at fixed time window.</a:t>
-            </a:r>
-          </a:p>
-          <a:p>
-            <a:r>
-              <a:rPr lang="en-US" dirty="0" smtClean="0"/>
-              <a:t>Non-leaf nodes fetch the aggregated data from all of its children, and aggregate the data after all children respond. </a:t>
-            </a:r>
-          </a:p>
-          <a:p>
-            <a:r>
-              <a:rPr lang="en-US" dirty="0" smtClean="0"/>
-              <a:t>Non-leaf nodes can publish aggregates with the same time window T; or n * T, n = 1, 2, 3...</a:t>
-            </a:r>
-            <a:endParaRPr lang="en-US" dirty="0"/>
+              <a:t>Physical location branch contains the encrypted data gathered or aggregated at each level</a:t>
+            </a:r>
+          </a:p>
+          <a:p>
+            <a:pPr lvl="1"/>
+            <a:r>
+              <a:rPr lang="en-US" dirty="0" smtClean="0"/>
+              <a:t>In the example, “xfmr-6.dmd.inst” is referring to a specific sensor that publishes “electricity demand” data. The data type is reflected in the name components (in this case, “electricity – aggregated average”).</a:t>
+            </a:r>
+          </a:p>
+          <a:p>
+            <a:r>
+              <a:rPr lang="en-US" dirty="0" smtClean="0"/>
+              <a:t>“User” branch keeps the list of user identities</a:t>
+            </a:r>
+          </a:p>
+          <a:p>
+            <a:r>
+              <a:rPr lang="en-US" dirty="0" smtClean="0"/>
+              <a:t>“Read” branch keeps the list of access control groups</a:t>
+            </a:r>
           </a:p>
         </p:txBody>
       </p:sp>
@@ -4613,20 +5306,13 @@
     </p:spTree>
     <p:extLst>
       <p:ext uri="{BB962C8B-B14F-4D97-AF65-F5344CB8AC3E}">
-        <p14:creationId xmlns:p14="http://schemas.microsoft.com/office/powerpoint/2010/main" val="2953193259"/>
+        <p14:creationId xmlns:p14="http://schemas.microsoft.com/office/powerpoint/2010/main" val="1497768676"/>
       </p:ext>
     </p:extLst>
   </p:cSld>
   <p:clrMapOvr>
     <a:masterClrMapping/>
   </p:clrMapOvr>
-  <p:timing>
-    <p:tnLst>
-      <p:par>
-        <p:cTn xmlns:p14="http://schemas.microsoft.com/office/powerpoint/2010/main" id="1" dur="indefinite" restart="never" nodeType="tmRoot"/>
-      </p:par>
-    </p:tnLst>
-  </p:timing>
 </p:sld>
 </file>
 
@@ -4664,7 +5350,7 @@
           <a:p>
             <a:r>
               <a:rPr lang="en-US" dirty="0" smtClean="0"/>
-              <a:t>Moving data across levels</a:t>
+              <a:t>Hierarchical storage</a:t>
             </a:r>
             <a:endParaRPr lang="en-US" dirty="0"/>
           </a:p>
@@ -4682,12 +5368,48 @@
         </p:nvSpPr>
         <p:spPr/>
         <p:txBody>
-          <a:bodyPr/>
-          <a:lstStyle/>
-          <a:p>
-            <a:r>
-              <a:rPr lang="en-US" dirty="0" smtClean="0"/>
-              <a:t>Long lived interests for fixed (configured) time window</a:t>
+          <a:bodyPr>
+            <a:normAutofit lnSpcReduction="10000"/>
+          </a:bodyPr>
+          <a:lstStyle/>
+          <a:p>
+            <a:r>
+              <a:rPr lang="en-US" dirty="0" smtClean="0"/>
+              <a:t>Raw data collected, kept, and batched only at the leaf nodes.</a:t>
+            </a:r>
+          </a:p>
+          <a:p>
+            <a:r>
+              <a:rPr lang="en-US" dirty="0" smtClean="0"/>
+              <a:t>Leaf nodes publish aggregated (min, sum, </a:t>
+            </a:r>
+            <a:r>
+              <a:rPr lang="en-US" dirty="0" err="1" smtClean="0"/>
+              <a:t>avg</a:t>
+            </a:r>
+            <a:r>
+              <a:rPr lang="en-US" dirty="0" smtClean="0"/>
+              <a:t>, </a:t>
+            </a:r>
+            <a:r>
+              <a:rPr lang="en-US" dirty="0" err="1" smtClean="0"/>
+              <a:t>etc</a:t>
+            </a:r>
+            <a:r>
+              <a:rPr lang="en-US" dirty="0" smtClean="0"/>
+              <a:t>) data at fixed time window.</a:t>
+            </a:r>
+          </a:p>
+          <a:p>
+            <a:r>
+              <a:rPr lang="en-US" dirty="0" smtClean="0"/>
+              <a:t>Non-leaf nodes fetch the aggregated data from all of its children, and aggregate the data after all children respond. </a:t>
+            </a:r>
+          </a:p>
+          <a:p>
+            <a:r>
+              <a:rPr lang="en-US" dirty="0" smtClean="0"/>
+              <a:t>Non-leaf nodes can publish aggregates with the same time window T; or n * T, n = 1, 2, 3...</a:t>
             </a:r>
             <a:endParaRPr lang="en-US" dirty="0"/>
           </a:p>
@@ -4716,40 +5438,10 @@
           </a:p>
         </p:txBody>
       </p:sp>
-      <p:pic>
-        <p:nvPicPr>
-          <p:cNvPr id="6" name="Picture 5" descr="bms-move-aggregate-sequence.pdf"/>
-          <p:cNvPicPr>
-            <a:picLocks noChangeAspect="1"/>
-          </p:cNvPicPr>
-          <p:nvPr/>
-        </p:nvPicPr>
-        <p:blipFill>
-          <a:blip r:embed="rId2">
-            <a:extLst>
-              <a:ext uri="{28A0092B-C50C-407E-A947-70E740481C1C}">
-                <a14:useLocalDpi xmlns:a14="http://schemas.microsoft.com/office/drawing/2010/main" val="0"/>
-              </a:ext>
-            </a:extLst>
-          </a:blip>
-          <a:stretch>
-            <a:fillRect/>
-          </a:stretch>
-        </p:blipFill>
-        <p:spPr>
-          <a:xfrm>
-            <a:off x="805320" y="2943280"/>
-            <a:ext cx="7505700" cy="3289300"/>
-          </a:xfrm>
-          <a:prstGeom prst="rect">
-            <a:avLst/>
-          </a:prstGeom>
-        </p:spPr>
-      </p:pic>
     </p:spTree>
     <p:extLst>
       <p:ext uri="{BB962C8B-B14F-4D97-AF65-F5344CB8AC3E}">
-        <p14:creationId xmlns:p14="http://schemas.microsoft.com/office/powerpoint/2010/main" val="2876717946"/>
+        <p14:creationId xmlns:p14="http://schemas.microsoft.com/office/powerpoint/2010/main" val="2953193259"/>
       </p:ext>
     </p:extLst>
   </p:cSld>
@@ -4800,6 +5492,142 @@
           <a:p>
             <a:r>
               <a:rPr lang="en-US" dirty="0" smtClean="0"/>
+              <a:t>Moving data across levels</a:t>
+            </a:r>
+            <a:endParaRPr lang="en-US" dirty="0"/>
+          </a:p>
+        </p:txBody>
+      </p:sp>
+      <p:sp>
+        <p:nvSpPr>
+          <p:cNvPr id="3" name="Content Placeholder 2"/>
+          <p:cNvSpPr>
+            <a:spLocks noGrp="1"/>
+          </p:cNvSpPr>
+          <p:nvPr>
+            <p:ph idx="1"/>
+          </p:nvPr>
+        </p:nvSpPr>
+        <p:spPr/>
+        <p:txBody>
+          <a:bodyPr/>
+          <a:lstStyle/>
+          <a:p>
+            <a:r>
+              <a:rPr lang="en-US" dirty="0" smtClean="0"/>
+              <a:t>Long lived interests for fixed (configured) time window</a:t>
+            </a:r>
+            <a:endParaRPr lang="en-US" dirty="0"/>
+          </a:p>
+        </p:txBody>
+      </p:sp>
+      <p:sp>
+        <p:nvSpPr>
+          <p:cNvPr id="4" name="Slide Number Placeholder 3"/>
+          <p:cNvSpPr>
+            <a:spLocks noGrp="1"/>
+          </p:cNvSpPr>
+          <p:nvPr>
+            <p:ph type="sldNum" sz="quarter" idx="12"/>
+          </p:nvPr>
+        </p:nvSpPr>
+        <p:spPr/>
+        <p:txBody>
+          <a:bodyPr/>
+          <a:lstStyle/>
+          <a:p>
+            <a:fld id="{2A6259AD-43E4-E44A-87BB-B535EA9DBBCD}" type="slidenum">
+              <a:rPr lang="en-US" smtClean="0"/>
+              <a:t>6</a:t>
+            </a:fld>
+            <a:endParaRPr lang="en-US"/>
+          </a:p>
+        </p:txBody>
+      </p:sp>
+      <p:pic>
+        <p:nvPicPr>
+          <p:cNvPr id="5" name="Picture 4" descr="bms-move-aggregate-sequence.pdf"/>
+          <p:cNvPicPr>
+            <a:picLocks noChangeAspect="1"/>
+          </p:cNvPicPr>
+          <p:nvPr/>
+        </p:nvPicPr>
+        <p:blipFill>
+          <a:blip r:embed="rId2">
+            <a:extLst>
+              <a:ext uri="{28A0092B-C50C-407E-A947-70E740481C1C}">
+                <a14:useLocalDpi xmlns:a14="http://schemas.microsoft.com/office/drawing/2010/main" val="0"/>
+              </a:ext>
+            </a:extLst>
+          </a:blip>
+          <a:stretch>
+            <a:fillRect/>
+          </a:stretch>
+        </p:blipFill>
+        <p:spPr>
+          <a:xfrm>
+            <a:off x="427054" y="2903711"/>
+            <a:ext cx="8216900" cy="3289300"/>
+          </a:xfrm>
+          <a:prstGeom prst="rect">
+            <a:avLst/>
+          </a:prstGeom>
+        </p:spPr>
+      </p:pic>
+    </p:spTree>
+    <p:extLst>
+      <p:ext uri="{BB962C8B-B14F-4D97-AF65-F5344CB8AC3E}">
+        <p14:creationId xmlns:p14="http://schemas.microsoft.com/office/powerpoint/2010/main" val="2876717946"/>
+      </p:ext>
+    </p:extLst>
+  </p:cSld>
+  <p:clrMapOvr>
+    <a:masterClrMapping/>
+  </p:clrMapOvr>
+  <p:timing>
+    <p:tnLst>
+      <p:par>
+        <p:cTn xmlns:p14="http://schemas.microsoft.com/office/powerpoint/2010/main" id="1" dur="indefinite" restart="never" nodeType="tmRoot"/>
+      </p:par>
+    </p:tnLst>
+  </p:timing>
+</p:sld>
+</file>
+
+<file path=ppt/slides/slide7.xml><?xml version="1.0" encoding="utf-8"?>
+<p:sld xmlns:a="http://schemas.openxmlformats.org/drawingml/2006/main" xmlns:r="http://schemas.openxmlformats.org/officeDocument/2006/relationships" xmlns:p="http://schemas.openxmlformats.org/presentationml/2006/main">
+  <p:cSld>
+    <p:spTree>
+      <p:nvGrpSpPr>
+        <p:cNvPr id="1" name=""/>
+        <p:cNvGrpSpPr/>
+        <p:nvPr/>
+      </p:nvGrpSpPr>
+      <p:grpSpPr>
+        <a:xfrm>
+          <a:off x="0" y="0"/>
+          <a:ext cx="0" cy="0"/>
+          <a:chOff x="0" y="0"/>
+          <a:chExt cx="0" cy="0"/>
+        </a:xfrm>
+      </p:grpSpPr>
+      <p:sp>
+        <p:nvSpPr>
+          <p:cNvPr id="2" name="Title 1"/>
+          <p:cNvSpPr>
+            <a:spLocks noGrp="1"/>
+          </p:cNvSpPr>
+          <p:nvPr>
+            <p:ph type="title"/>
+          </p:nvPr>
+        </p:nvSpPr>
+        <p:spPr/>
+        <p:txBody>
+          <a:bodyPr/>
+          <a:lstStyle/>
+          <a:p>
+            <a:r>
+              <a:rPr lang="en-US" dirty="0" smtClean="0"/>
               <a:t>Signing/Verification</a:t>
             </a:r>
             <a:endParaRPr lang="en-US" dirty="0"/>
@@ -4823,7 +5651,7 @@
           <a:p>
             <a:fld id="{2A6259AD-43E4-E44A-87BB-B535EA9DBBCD}" type="slidenum">
               <a:rPr lang="en-US" smtClean="0"/>
-              <a:t>6</a:t>
+              <a:t>7</a:t>
             </a:fld>
             <a:endParaRPr lang="en-US"/>
           </a:p>
@@ -4869,320 +5697,13 @@
   <p:clrMapOvr>
     <a:masterClrMapping/>
   </p:clrMapOvr>
-</p:sld>
-</file>
-
-<file path=ppt/slides/slide7.xml><?xml version="1.0" encoding="utf-8"?>
-<p:sld xmlns:a="http://schemas.openxmlformats.org/drawingml/2006/main" xmlns:r="http://schemas.openxmlformats.org/officeDocument/2006/relationships" xmlns:p="http://schemas.openxmlformats.org/presentationml/2006/main">
-  <p:cSld>
-    <p:spTree>
-      <p:nvGrpSpPr>
-        <p:cNvPr id="1" name=""/>
-        <p:cNvGrpSpPr/>
-        <p:nvPr/>
-      </p:nvGrpSpPr>
-      <p:grpSpPr>
-        <a:xfrm>
-          <a:off x="0" y="0"/>
-          <a:ext cx="0" cy="0"/>
-          <a:chOff x="0" y="0"/>
-          <a:chExt cx="0" cy="0"/>
-        </a:xfrm>
-      </p:grpSpPr>
-      <p:sp>
-        <p:nvSpPr>
-          <p:cNvPr id="2" name="Title 1"/>
-          <p:cNvSpPr>
-            <a:spLocks noGrp="1"/>
-          </p:cNvSpPr>
-          <p:nvPr>
-            <p:ph type="title"/>
-          </p:nvPr>
-        </p:nvSpPr>
-        <p:spPr/>
-        <p:txBody>
-          <a:bodyPr/>
-          <a:lstStyle/>
-          <a:p>
-            <a:r>
-              <a:rPr lang="en-US" dirty="0" smtClean="0"/>
-              <a:t>Encryption/Decryption</a:t>
-            </a:r>
-            <a:endParaRPr lang="en-US" dirty="0"/>
-          </a:p>
-        </p:txBody>
-      </p:sp>
-      <p:sp>
-        <p:nvSpPr>
-          <p:cNvPr id="3" name="Content Placeholder 2"/>
-          <p:cNvSpPr>
-            <a:spLocks noGrp="1"/>
-          </p:cNvSpPr>
-          <p:nvPr>
-            <p:ph idx="1"/>
-          </p:nvPr>
-        </p:nvSpPr>
-        <p:spPr/>
-        <p:txBody>
-          <a:bodyPr>
-            <a:normAutofit fontScale="85000" lnSpcReduction="10000"/>
-          </a:bodyPr>
-          <a:lstStyle/>
-          <a:p>
-            <a:r>
-              <a:rPr lang="en-US" dirty="0" smtClean="0"/>
-              <a:t>Group based access control</a:t>
-            </a:r>
-          </a:p>
-          <a:p>
-            <a:r>
-              <a:rPr lang="en-US" dirty="0" smtClean="0"/>
-              <a:t>Each BMS node has a producer namespace and multiple data types</a:t>
-            </a:r>
-          </a:p>
-          <a:p>
-            <a:pPr lvl="1"/>
-            <a:r>
-              <a:rPr lang="en-US" dirty="0" smtClean="0"/>
-              <a:t>/</a:t>
-            </a:r>
-            <a:r>
-              <a:rPr lang="en-US" dirty="0" err="1" smtClean="0"/>
-              <a:t>ndn</a:t>
-            </a:r>
-            <a:r>
-              <a:rPr lang="en-US" dirty="0" smtClean="0"/>
-              <a:t>/app/</a:t>
-            </a:r>
-            <a:r>
-              <a:rPr lang="en-US" dirty="0" err="1" smtClean="0"/>
-              <a:t>bms</a:t>
-            </a:r>
-            <a:r>
-              <a:rPr lang="en-US" dirty="0" smtClean="0"/>
-              <a:t>/</a:t>
-            </a:r>
-            <a:r>
-              <a:rPr lang="en-US" dirty="0" err="1" smtClean="0"/>
-              <a:t>ucla</a:t>
-            </a:r>
-            <a:r>
-              <a:rPr lang="en-US" dirty="0" smtClean="0"/>
-              <a:t>/data/</a:t>
-            </a:r>
-            <a:r>
-              <a:rPr lang="en-US" dirty="0"/>
-              <a:t>;</a:t>
-            </a:r>
-            <a:r>
-              <a:rPr lang="en-US" dirty="0" smtClean="0"/>
-              <a:t>   produces: electricity, steam</a:t>
-            </a:r>
-          </a:p>
-          <a:p>
-            <a:pPr lvl="1"/>
-            <a:r>
-              <a:rPr lang="en-US" dirty="0" smtClean="0"/>
-              <a:t>/</a:t>
-            </a:r>
-            <a:r>
-              <a:rPr lang="en-US" dirty="0" err="1" smtClean="0"/>
-              <a:t>ndn</a:t>
-            </a:r>
-            <a:r>
-              <a:rPr lang="en-US" dirty="0" smtClean="0"/>
-              <a:t>/app/</a:t>
-            </a:r>
-            <a:r>
-              <a:rPr lang="en-US" dirty="0" err="1" smtClean="0"/>
-              <a:t>bms</a:t>
-            </a:r>
-            <a:r>
-              <a:rPr lang="en-US" dirty="0" smtClean="0"/>
-              <a:t>/</a:t>
-            </a:r>
-            <a:r>
-              <a:rPr lang="en-US" dirty="0" err="1"/>
-              <a:t>ucla</a:t>
-            </a:r>
-            <a:r>
-              <a:rPr lang="en-US" dirty="0" smtClean="0"/>
-              <a:t>/</a:t>
-            </a:r>
-            <a:r>
-              <a:rPr lang="en-US" dirty="0" err="1" smtClean="0"/>
-              <a:t>melnitz</a:t>
-            </a:r>
-            <a:r>
-              <a:rPr lang="en-US" dirty="0" smtClean="0"/>
-              <a:t>/data/;   producer: electricity</a:t>
-            </a:r>
-            <a:endParaRPr lang="en-US" dirty="0"/>
-          </a:p>
-          <a:p>
-            <a:r>
-              <a:rPr lang="en-US" dirty="0" smtClean="0"/>
-              <a:t>For each producer namespace and data type, we have a group manager; Namespace:</a:t>
-            </a:r>
-          </a:p>
-          <a:p>
-            <a:pPr lvl="1"/>
-            <a:r>
-              <a:rPr lang="en-US" dirty="0" smtClean="0"/>
-              <a:t>/</a:t>
-            </a:r>
-            <a:r>
-              <a:rPr lang="en-US" dirty="0" err="1" smtClean="0"/>
-              <a:t>ndn</a:t>
-            </a:r>
-            <a:r>
-              <a:rPr lang="en-US" dirty="0" smtClean="0"/>
-              <a:t>/app/</a:t>
-            </a:r>
-            <a:r>
-              <a:rPr lang="en-US" dirty="0" err="1" smtClean="0"/>
-              <a:t>bms</a:t>
-            </a:r>
-            <a:r>
-              <a:rPr lang="en-US" dirty="0" smtClean="0"/>
-              <a:t>/</a:t>
-            </a:r>
-            <a:r>
-              <a:rPr lang="en-US" dirty="0" err="1" smtClean="0"/>
-              <a:t>ucla</a:t>
-            </a:r>
-            <a:r>
-              <a:rPr lang="en-US" dirty="0" smtClean="0"/>
-              <a:t>/</a:t>
-            </a:r>
-            <a:r>
-              <a:rPr lang="en-US" dirty="0"/>
-              <a:t>data/</a:t>
-            </a:r>
-            <a:r>
-              <a:rPr lang="en-US" dirty="0" smtClean="0"/>
-              <a:t>read/electricity</a:t>
-            </a:r>
-            <a:endParaRPr lang="en-US" dirty="0"/>
-          </a:p>
-          <a:p>
-            <a:pPr lvl="1"/>
-            <a:r>
-              <a:rPr lang="en-US" dirty="0"/>
-              <a:t>/</a:t>
-            </a:r>
-            <a:r>
-              <a:rPr lang="en-US" dirty="0" err="1"/>
-              <a:t>ndn</a:t>
-            </a:r>
-            <a:r>
-              <a:rPr lang="en-US" dirty="0"/>
-              <a:t>/app/</a:t>
-            </a:r>
-            <a:r>
-              <a:rPr lang="en-US" dirty="0" err="1"/>
-              <a:t>bms</a:t>
-            </a:r>
-            <a:r>
-              <a:rPr lang="en-US" dirty="0"/>
-              <a:t>/</a:t>
-            </a:r>
-            <a:r>
-              <a:rPr lang="en-US" dirty="0" err="1"/>
-              <a:t>ucla</a:t>
-            </a:r>
-            <a:r>
-              <a:rPr lang="en-US" dirty="0"/>
-              <a:t>/data/read</a:t>
-            </a:r>
-            <a:r>
-              <a:rPr lang="en-US" dirty="0" smtClean="0"/>
-              <a:t>/steam</a:t>
-            </a:r>
-          </a:p>
-          <a:p>
-            <a:pPr lvl="1"/>
-            <a:r>
-              <a:rPr lang="en-US" dirty="0"/>
-              <a:t>/</a:t>
-            </a:r>
-            <a:r>
-              <a:rPr lang="en-US" dirty="0" err="1"/>
-              <a:t>ndn</a:t>
-            </a:r>
-            <a:r>
-              <a:rPr lang="en-US" dirty="0"/>
-              <a:t>/app/</a:t>
-            </a:r>
-            <a:r>
-              <a:rPr lang="en-US" dirty="0" err="1"/>
-              <a:t>bms</a:t>
-            </a:r>
-            <a:r>
-              <a:rPr lang="en-US" dirty="0"/>
-              <a:t>/</a:t>
-            </a:r>
-            <a:r>
-              <a:rPr lang="en-US" dirty="0" err="1"/>
-              <a:t>ucla</a:t>
-            </a:r>
-            <a:r>
-              <a:rPr lang="en-US" dirty="0" smtClean="0"/>
-              <a:t>/</a:t>
-            </a:r>
-            <a:r>
-              <a:rPr lang="en-US" dirty="0" err="1" smtClean="0"/>
-              <a:t>melnitz</a:t>
-            </a:r>
-            <a:r>
-              <a:rPr lang="en-US" dirty="0" smtClean="0"/>
-              <a:t>/data</a:t>
-            </a:r>
-            <a:r>
-              <a:rPr lang="en-US" dirty="0"/>
-              <a:t>/read/</a:t>
-            </a:r>
-            <a:r>
-              <a:rPr lang="en-US" dirty="0" smtClean="0"/>
-              <a:t>electricity</a:t>
-            </a:r>
-            <a:endParaRPr lang="en-US" dirty="0"/>
-          </a:p>
-        </p:txBody>
-      </p:sp>
-      <p:sp>
-        <p:nvSpPr>
-          <p:cNvPr id="4" name="Slide Number Placeholder 3"/>
-          <p:cNvSpPr>
-            <a:spLocks noGrp="1"/>
-          </p:cNvSpPr>
-          <p:nvPr>
-            <p:ph type="sldNum" sz="quarter" idx="12"/>
-          </p:nvPr>
-        </p:nvSpPr>
-        <p:spPr/>
-        <p:txBody>
-          <a:bodyPr/>
-          <a:lstStyle/>
-          <a:p>
-            <a:fld id="{2A6259AD-43E4-E44A-87BB-B535EA9DBBCD}" type="slidenum">
-              <a:rPr lang="en-US" smtClean="0"/>
-              <a:t>7</a:t>
-            </a:fld>
-            <a:endParaRPr lang="en-US"/>
-          </a:p>
-        </p:txBody>
-      </p:sp>
-    </p:spTree>
-    <p:extLst>
-      <p:ext uri="{BB962C8B-B14F-4D97-AF65-F5344CB8AC3E}">
-        <p14:creationId xmlns:p14="http://schemas.microsoft.com/office/powerpoint/2010/main" val="1121887613"/>
-      </p:ext>
-    </p:extLst>
-  </p:cSld>
-  <p:clrMapOvr>
-    <a:masterClrMapping/>
-  </p:clrMapOvr>
+  <p:timing>
+    <p:tnLst>
+      <p:par>
+        <p:cTn xmlns:p14="http://schemas.microsoft.com/office/powerpoint/2010/main" id="1" dur="indefinite" restart="never" nodeType="tmRoot"/>
+      </p:par>
+    </p:tnLst>
+  </p:timing>
 </p:sld>
 </file>
 
@@ -5219,16 +5740,24 @@
           <a:lstStyle/>
           <a:p>
             <a:r>
+              <a:rPr lang="en-US" dirty="0" smtClean="0"/>
+              <a:t>Group based </a:t>
+            </a:r>
+            <a:r>
               <a:rPr lang="en-US" dirty="0"/>
-              <a:t>Encryption/</a:t>
-            </a:r>
-            <a:r>
-              <a:rPr lang="en-US" dirty="0" smtClean="0"/>
-              <a:t>Decryption - </a:t>
-            </a:r>
-            <a:r>
-              <a:rPr lang="en-US" dirty="0" err="1" smtClean="0"/>
-              <a:t>cont</a:t>
+              <a:t>a</a:t>
+            </a:r>
+            <a:r>
+              <a:rPr lang="en-US" dirty="0" smtClean="0"/>
+              <a:t>ccess </a:t>
+            </a:r>
+            <a:r>
+              <a:rPr lang="en-US" dirty="0"/>
+              <a:t>c</a:t>
+            </a:r>
+            <a:r>
+              <a:rPr lang="en-US" dirty="0" smtClean="0"/>
+              <a:t>ontrol</a:t>
             </a:r>
             <a:endParaRPr lang="en-US" dirty="0"/>
           </a:p>
@@ -5253,14 +5782,41 @@
           <a:p>
             <a:r>
               <a:rPr lang="en-US" dirty="0" smtClean="0"/>
-              <a:t>Each group manager keeps the members that can read the corresponding data</a:t>
-            </a:r>
+              <a:t>Example: access control at room and data type level</a:t>
+            </a:r>
+          </a:p>
+          <a:p>
+            <a:r>
+              <a:rPr lang="en-US" dirty="0" smtClean="0"/>
+              <a:t>Each </a:t>
+            </a:r>
+            <a:r>
+              <a:rPr lang="en-US" dirty="0" smtClean="0"/>
+              <a:t>producer at room level or higher has a group for every type of data that it produces. Example group names:</a:t>
+            </a:r>
+            <a:endParaRPr lang="en-US" dirty="0" smtClean="0"/>
           </a:p>
           <a:p>
             <a:pPr lvl="1"/>
             <a:r>
               <a:rPr lang="en-US" dirty="0" smtClean="0"/>
-              <a:t>Identities are in /</a:t>
+              <a:t>“/</a:t>
+            </a:r>
+            <a:r>
+              <a:rPr lang="en-US" dirty="0" err="1" smtClean="0"/>
+              <a:t>ndn</a:t>
+            </a:r>
+            <a:r>
+              <a:rPr lang="en-US" dirty="0" smtClean="0"/>
+              <a:t>/app/</a:t>
+            </a:r>
+            <a:r>
+              <a:rPr lang="en-US" dirty="0" err="1" smtClean="0"/>
+              <a:t>bms</a:t>
+            </a:r>
+            <a:r>
+              <a:rPr lang="en-US" dirty="0" smtClean="0"/>
+              <a:t>/</a:t>
             </a:r>
             <a:r>
               <a:rPr lang="en-US" dirty="0" err="1" smtClean="0"/>
@@ -5268,14 +5824,6 @@
             </a:r>
             <a:r>
               <a:rPr lang="en-US" dirty="0" smtClean="0"/>
-              <a:t>/read/electricity’s group does not have access to /</a:t>
-            </a:r>
-            <a:r>
-              <a:rPr lang="en-US" dirty="0" err="1" smtClean="0"/>
-              <a:t>ucla</a:t>
-            </a:r>
-            <a:r>
-              <a:rPr lang="en-US" dirty="0" smtClean="0"/>
               <a:t>/</a:t>
             </a:r>
             <a:r>
@@ -5284,33 +5832,73 @@
             </a:r>
             <a:r>
               <a:rPr lang="en-US" dirty="0" smtClean="0"/>
-              <a:t>/read/electricity, unless explicitly added to the latter’s group</a:t>
+              <a:t>/1469A/</a:t>
+            </a:r>
+            <a:r>
+              <a:rPr lang="en-US" dirty="0" smtClean="0"/>
+              <a:t>data/”: users in this group have access to all the data in </a:t>
+            </a:r>
+            <a:r>
+              <a:rPr lang="en-US" dirty="0" err="1" smtClean="0"/>
+              <a:t>Melnitz</a:t>
+            </a:r>
+            <a:r>
+              <a:rPr lang="en-US" dirty="0" smtClean="0"/>
+              <a:t> 1469A</a:t>
+            </a:r>
+            <a:endParaRPr lang="en-US" dirty="0" smtClean="0"/>
+          </a:p>
+          <a:p>
+            <a:pPr lvl="1"/>
+            <a:r>
+              <a:rPr lang="en-US" dirty="0" smtClean="0"/>
+              <a:t>“/</a:t>
+            </a:r>
+            <a:r>
+              <a:rPr lang="en-US" dirty="0" err="1" smtClean="0"/>
+              <a:t>ndn</a:t>
+            </a:r>
+            <a:r>
+              <a:rPr lang="en-US" dirty="0" smtClean="0"/>
+              <a:t>/app/</a:t>
+            </a:r>
+            <a:r>
+              <a:rPr lang="en-US" dirty="0" err="1" smtClean="0"/>
+              <a:t>bms</a:t>
+            </a:r>
+            <a:r>
+              <a:rPr lang="en-US" dirty="0" smtClean="0"/>
+              <a:t>/</a:t>
+            </a:r>
+            <a:r>
+              <a:rPr lang="en-US" dirty="0" err="1"/>
+              <a:t>ucla</a:t>
+            </a:r>
+            <a:r>
+              <a:rPr lang="en-US" dirty="0" smtClean="0"/>
+              <a:t>/</a:t>
+            </a:r>
+            <a:r>
+              <a:rPr lang="en-US" dirty="0" err="1" smtClean="0"/>
+              <a:t>melnitz</a:t>
+            </a:r>
+            <a:r>
+              <a:rPr lang="en-US" dirty="0" smtClean="0"/>
+              <a:t>/data</a:t>
+            </a:r>
+            <a:r>
+              <a:rPr lang="en-US" dirty="0" smtClean="0"/>
+              <a:t>/electricity”: users in this group have access to </a:t>
+            </a:r>
+            <a:r>
+              <a:rPr lang="en-US" dirty="0" err="1" smtClean="0"/>
+              <a:t>Melnitz</a:t>
+            </a:r>
+            <a:r>
+              <a:rPr lang="en-US" dirty="0" smtClean="0"/>
+              <a:t> Hall’s electricity data</a:t>
             </a:r>
             <a:endParaRPr lang="en-US" dirty="0"/>
-          </a:p>
-          <a:p>
-            <a:r>
-              <a:rPr lang="en-US" dirty="0"/>
-              <a:t>Adding identities to a </a:t>
-            </a:r>
-            <a:r>
-              <a:rPr lang="en-US" dirty="0" smtClean="0"/>
-              <a:t>group</a:t>
-            </a:r>
-          </a:p>
-          <a:p>
-            <a:pPr lvl="1"/>
-            <a:r>
-              <a:rPr lang="en-US" dirty="0" smtClean="0"/>
-              <a:t>Upon receiving group command data (signed by a building manager who’s authorized to grant access)</a:t>
-            </a:r>
-          </a:p>
-          <a:p>
-            <a:pPr lvl="1"/>
-            <a:r>
-              <a:rPr lang="en-US" dirty="0" smtClean="0"/>
-              <a:t>Group generates missing E/D-Keys based on the schedule indicated</a:t>
-            </a:r>
           </a:p>
         </p:txBody>
       </p:sp>
@@ -5340,13 +5928,20 @@
     </p:spTree>
     <p:extLst>
       <p:ext uri="{BB962C8B-B14F-4D97-AF65-F5344CB8AC3E}">
-        <p14:creationId xmlns:p14="http://schemas.microsoft.com/office/powerpoint/2010/main" val="3870573126"/>
+        <p14:creationId xmlns:p14="http://schemas.microsoft.com/office/powerpoint/2010/main" val="1121887613"/>
       </p:ext>
     </p:extLst>
   </p:cSld>
   <p:clrMapOvr>
     <a:masterClrMapping/>
   </p:clrMapOvr>
+  <p:timing>
+    <p:tnLst>
+      <p:par>
+        <p:cTn xmlns:p14="http://schemas.microsoft.com/office/powerpoint/2010/main" id="1" dur="indefinite" restart="never" nodeType="tmRoot"/>
+      </p:par>
+    </p:tnLst>
+  </p:timing>
 </p:sld>
 </file>
 
@@ -5377,14 +5972,27 @@
             <p:ph type="title"/>
           </p:nvPr>
         </p:nvSpPr>
-        <p:spPr/>
-        <p:txBody>
-          <a:bodyPr/>
-          <a:lstStyle/>
-          <a:p>
-            <a:r>
-              <a:rPr lang="en-US" dirty="0" smtClean="0"/>
-              <a:t>Implementation Components</a:t>
+        <p:spPr>
+          <a:xfrm>
+            <a:off x="457200" y="49588"/>
+            <a:ext cx="8229600" cy="1143000"/>
+          </a:xfrm>
+        </p:spPr>
+        <p:txBody>
+          <a:bodyPr/>
+          <a:lstStyle/>
+          <a:p>
+            <a:r>
+              <a:rPr lang="en-US" dirty="0" smtClean="0"/>
+              <a:t>Primary and secondary </a:t>
+            </a:r>
+            <a:r>
+              <a:rPr lang="en-US" dirty="0"/>
+              <a:t>g</a:t>
+            </a:r>
+            <a:r>
+              <a:rPr lang="en-US" dirty="0" smtClean="0"/>
+              <a:t>roups</a:t>
             </a:r>
             <a:endParaRPr lang="en-US" dirty="0"/>
           </a:p>
@@ -5392,7 +6000,45 @@
       </p:sp>
       <p:sp>
         <p:nvSpPr>
-          <p:cNvPr id="5" name="Slide Number Placeholder 4"/>
+          <p:cNvPr id="3" name="Content Placeholder 2"/>
+          <p:cNvSpPr>
+            <a:spLocks noGrp="1"/>
+          </p:cNvSpPr>
+          <p:nvPr>
+            <p:ph idx="1"/>
+          </p:nvPr>
+        </p:nvSpPr>
+        <p:spPr>
+          <a:xfrm>
+            <a:off x="457201" y="1160439"/>
+            <a:ext cx="7790486" cy="816788"/>
+          </a:xfrm>
+        </p:spPr>
+        <p:txBody>
+          <a:bodyPr>
+            <a:normAutofit fontScale="85000" lnSpcReduction="20000"/>
+          </a:bodyPr>
+          <a:lstStyle/>
+          <a:p>
+            <a:r>
+              <a:rPr lang="en-US" dirty="0" smtClean="0"/>
+              <a:t>Primary/secondary group relationship for “electricity data in </a:t>
+            </a:r>
+            <a:r>
+              <a:rPr lang="en-US" dirty="0" err="1" smtClean="0"/>
+              <a:t>Melnitz</a:t>
+            </a:r>
+            <a:r>
+              <a:rPr lang="en-US" dirty="0" smtClean="0"/>
+              <a:t> 1469A”</a:t>
+            </a:r>
+            <a:endParaRPr lang="en-US" dirty="0"/>
+          </a:p>
+        </p:txBody>
+      </p:sp>
+      <p:sp>
+        <p:nvSpPr>
+          <p:cNvPr id="4" name="Slide Number Placeholder 3"/>
           <p:cNvSpPr>
             <a:spLocks noGrp="1"/>
           </p:cNvSpPr>
@@ -5415,7 +6061,7 @@
       </p:sp>
       <p:pic>
         <p:nvPicPr>
-          <p:cNvPr id="3" name="Picture 2" descr="bms-nodes-structure.pdf"/>
+          <p:cNvPr id="6" name="Picture 5" descr="group-relationship.pdf"/>
           <p:cNvPicPr>
             <a:picLocks noChangeAspect="1"/>
           </p:cNvPicPr>
@@ -5435,63 +6081,18 @@
         </p:blipFill>
         <p:spPr>
           <a:xfrm>
-            <a:off x="1238430" y="1181101"/>
-            <a:ext cx="6654396" cy="4569148"/>
+            <a:off x="1403555" y="1977227"/>
+            <a:ext cx="6316003" cy="4554328"/>
           </a:xfrm>
           <a:prstGeom prst="rect">
             <a:avLst/>
           </a:prstGeom>
         </p:spPr>
       </p:pic>
-      <p:sp>
-        <p:nvSpPr>
-          <p:cNvPr id="6" name="Content Placeholder 2"/>
-          <p:cNvSpPr>
-            <a:spLocks noGrp="1"/>
-          </p:cNvSpPr>
-          <p:nvPr>
-            <p:ph idx="1"/>
-          </p:nvPr>
-        </p:nvSpPr>
-        <p:spPr>
-          <a:xfrm>
-            <a:off x="457200" y="5780340"/>
-            <a:ext cx="8229600" cy="719228"/>
-          </a:xfrm>
-        </p:spPr>
-        <p:txBody>
-          <a:bodyPr>
-            <a:normAutofit fontScale="77500" lnSpcReduction="20000"/>
-          </a:bodyPr>
-          <a:lstStyle/>
-          <a:p>
-            <a:pPr marL="0" indent="0">
-              <a:buNone/>
-            </a:pPr>
-            <a:r>
-              <a:rPr lang="en-US" dirty="0" smtClean="0"/>
-              <a:t>(Each line is a </a:t>
-            </a:r>
-            <a:r>
-              <a:rPr lang="en-US" dirty="0"/>
-              <a:t>face from parent node to child node, with child's prefix </a:t>
-            </a:r>
-            <a:r>
-              <a:rPr lang="en-US" dirty="0" smtClean="0"/>
-              <a:t>registered)</a:t>
-            </a:r>
-            <a:endParaRPr lang="en-US" dirty="0" smtClean="0">
-              <a:solidFill>
-                <a:srgbClr val="FF0000"/>
-              </a:solidFill>
-            </a:endParaRPr>
-          </a:p>
-        </p:txBody>
-      </p:sp>
     </p:spTree>
     <p:extLst>
       <p:ext uri="{BB962C8B-B14F-4D97-AF65-F5344CB8AC3E}">
-        <p14:creationId xmlns:p14="http://schemas.microsoft.com/office/powerpoint/2010/main" val="3999802342"/>
+        <p14:creationId xmlns:p14="http://schemas.microsoft.com/office/powerpoint/2010/main" val="1584779820"/>
       </p:ext>
     </p:extLst>
   </p:cSld>

</xml_diff>